<commit_message>
updated slides and powerpoint
</commit_message>
<xml_diff>
--- a/Game Freak Company Analysis.pptx
+++ b/Game Freak Company Analysis.pptx
@@ -3334,7 +3334,7 @@
           <p:cNvPr id="0" name="slide1">
             <a:extLst>
               <a:ext uri="{FF2B5EF4-FFF2-40B4-BE49-F238E27FC236}">
-                <a16:creationId xmlns:a16="http://schemas.microsoft.com/office/drawing/2014/main" id="{BC257F27-7032-4045-9E4E-4C37BE7EBDDB}"/>
+                <a16:creationId xmlns:a16="http://schemas.microsoft.com/office/drawing/2014/main" id="{4E3898A3-EC02-4F04-9BE0-DBFF79C39B51}"/>
               </a:ext>
             </a:extLst>
           </p:cNvPr>
@@ -3362,7 +3362,7 @@
           <p:cNvPr id="1" name="slide1">
             <a:extLst>
               <a:ext uri="{FF2B5EF4-FFF2-40B4-BE49-F238E27FC236}">
-                <a16:creationId xmlns:a16="http://schemas.microsoft.com/office/drawing/2014/main" id="{10EFD15C-0493-4CB9-9309-54B3CE3E8673}"/>
+                <a16:creationId xmlns:a16="http://schemas.microsoft.com/office/drawing/2014/main" id="{E79822F4-D1A2-4A1E-B7D1-0B0A2195CC22}"/>
               </a:ext>
             </a:extLst>
           </p:cNvPr>
@@ -3380,7 +3380,7 @@
           <a:p>
             <a:r>
               <a:rPr/>
-              <a:t>File created on: 11/4/21 3:56:39 AM EDT</a:t>
+              <a:t>File created on: 12/6/21 2:59:41 PM EST</a:t>
             </a:r>
           </a:p>
         </p:txBody>
@@ -3420,7 +3420,7 @@
           <p:cNvPr descr="Story6" id="2" name="slide2">
             <a:extLst>
               <a:ext uri="{FF2B5EF4-FFF2-40B4-BE49-F238E27FC236}">
-                <a16:creationId xmlns:a16="http://schemas.microsoft.com/office/drawing/2014/main" id="{284515F8-080D-449D-B6AE-BB2DDB1E9480}"/>
+                <a16:creationId xmlns:a16="http://schemas.microsoft.com/office/drawing/2014/main" id="{730D2901-6598-44C1-BEED-471AAFD60B1C}"/>
               </a:ext>
             </a:extLst>
           </p:cNvPr>
@@ -3486,7 +3486,7 @@
           <p:cNvPr descr="Story7" id="3" name="slide3">
             <a:extLst>
               <a:ext uri="{FF2B5EF4-FFF2-40B4-BE49-F238E27FC236}">
-                <a16:creationId xmlns:a16="http://schemas.microsoft.com/office/drawing/2014/main" id="{7923CC74-F2ED-4043-B765-F31E5C8183B0}"/>
+                <a16:creationId xmlns:a16="http://schemas.microsoft.com/office/drawing/2014/main" id="{A8D46A2D-2EFE-40EA-9FE1-82F630CA6779}"/>
               </a:ext>
             </a:extLst>
           </p:cNvPr>
@@ -3552,7 +3552,7 @@
           <p:cNvPr descr="Story1" id="4" name="slide4">
             <a:extLst>
               <a:ext uri="{FF2B5EF4-FFF2-40B4-BE49-F238E27FC236}">
-                <a16:creationId xmlns:a16="http://schemas.microsoft.com/office/drawing/2014/main" id="{201BD041-CD22-4A21-A6FE-0033641D858A}"/>
+                <a16:creationId xmlns:a16="http://schemas.microsoft.com/office/drawing/2014/main" id="{C6F2646F-8914-49C9-915E-26E9850E02C6}"/>
               </a:ext>
             </a:extLst>
           </p:cNvPr>
@@ -3618,7 +3618,7 @@
           <p:cNvPr descr="Story2" id="5" name="slide5">
             <a:extLst>
               <a:ext uri="{FF2B5EF4-FFF2-40B4-BE49-F238E27FC236}">
-                <a16:creationId xmlns:a16="http://schemas.microsoft.com/office/drawing/2014/main" id="{141E31F4-02EF-4D54-9043-91F706E57DBC}"/>
+                <a16:creationId xmlns:a16="http://schemas.microsoft.com/office/drawing/2014/main" id="{C11A67BD-D8F8-45C2-9FA9-C2C7030A5F01}"/>
               </a:ext>
             </a:extLst>
           </p:cNvPr>
@@ -3684,7 +3684,7 @@
           <p:cNvPr descr="Story3" id="6" name="slide6">
             <a:extLst>
               <a:ext uri="{FF2B5EF4-FFF2-40B4-BE49-F238E27FC236}">
-                <a16:creationId xmlns:a16="http://schemas.microsoft.com/office/drawing/2014/main" id="{5BA641D8-0D0F-46B7-BDD8-D694EBEDDB27}"/>
+                <a16:creationId xmlns:a16="http://schemas.microsoft.com/office/drawing/2014/main" id="{03E1D380-4128-4C51-97A5-ECAF938894BF}"/>
               </a:ext>
             </a:extLst>
           </p:cNvPr>
@@ -3750,7 +3750,7 @@
           <p:cNvPr descr="Story4" id="7" name="slide7">
             <a:extLst>
               <a:ext uri="{FF2B5EF4-FFF2-40B4-BE49-F238E27FC236}">
-                <a16:creationId xmlns:a16="http://schemas.microsoft.com/office/drawing/2014/main" id="{37D0F23A-0345-46DF-BE32-60D42B5421CD}"/>
+                <a16:creationId xmlns:a16="http://schemas.microsoft.com/office/drawing/2014/main" id="{A53E8F6A-D265-4B20-B66F-55394BD642CB}"/>
               </a:ext>
             </a:extLst>
           </p:cNvPr>
@@ -3816,7 +3816,7 @@
           <p:cNvPr descr="Story8" id="8" name="slide8">
             <a:extLst>
               <a:ext uri="{FF2B5EF4-FFF2-40B4-BE49-F238E27FC236}">
-                <a16:creationId xmlns:a16="http://schemas.microsoft.com/office/drawing/2014/main" id="{9808B7A7-5B78-475A-B3DD-E4F0A3F4A4E0}"/>
+                <a16:creationId xmlns:a16="http://schemas.microsoft.com/office/drawing/2014/main" id="{03D62CD8-FFF2-498D-8D8F-BCD05D9821AE}"/>
               </a:ext>
             </a:extLst>
           </p:cNvPr>
@@ -3882,7 +3882,7 @@
           <p:cNvPr descr="Story9" id="9" name="slide9">
             <a:extLst>
               <a:ext uri="{FF2B5EF4-FFF2-40B4-BE49-F238E27FC236}">
-                <a16:creationId xmlns:a16="http://schemas.microsoft.com/office/drawing/2014/main" id="{593803ED-BD3F-4510-B134-C5BC0A596532}"/>
+                <a16:creationId xmlns:a16="http://schemas.microsoft.com/office/drawing/2014/main" id="{5BE36FCA-CCBE-4300-B700-65130B881085}"/>
               </a:ext>
             </a:extLst>
           </p:cNvPr>

</xml_diff>